<commit_message>
diagrams: resolved discrepancies in UML diagram for RegisterCommand
</commit_message>
<xml_diff>
--- a/docs/diagrams/RegisterCommandUML.pptx
+++ b/docs/diagrams/RegisterCommandUML.pptx
@@ -261,7 +261,7 @@
           <a:p>
             <a:fld id="{128B42D0-5542-4246-B82D-1D330D744E73}" type="datetimeFigureOut">
               <a:rPr lang="en-IN" smtClean="0"/>
-              <a:t>15-10-2018</a:t>
+              <a:t>10-11-2018</a:t>
             </a:fld>
             <a:endParaRPr lang="en-IN"/>
           </a:p>
@@ -461,7 +461,7 @@
           <a:p>
             <a:fld id="{128B42D0-5542-4246-B82D-1D330D744E73}" type="datetimeFigureOut">
               <a:rPr lang="en-IN" smtClean="0"/>
-              <a:t>15-10-2018</a:t>
+              <a:t>10-11-2018</a:t>
             </a:fld>
             <a:endParaRPr lang="en-IN"/>
           </a:p>
@@ -671,7 +671,7 @@
           <a:p>
             <a:fld id="{128B42D0-5542-4246-B82D-1D330D744E73}" type="datetimeFigureOut">
               <a:rPr lang="en-IN" smtClean="0"/>
-              <a:t>15-10-2018</a:t>
+              <a:t>10-11-2018</a:t>
             </a:fld>
             <a:endParaRPr lang="en-IN"/>
           </a:p>
@@ -871,7 +871,7 @@
           <a:p>
             <a:fld id="{128B42D0-5542-4246-B82D-1D330D744E73}" type="datetimeFigureOut">
               <a:rPr lang="en-IN" smtClean="0"/>
-              <a:t>15-10-2018</a:t>
+              <a:t>10-11-2018</a:t>
             </a:fld>
             <a:endParaRPr lang="en-IN"/>
           </a:p>
@@ -1147,7 +1147,7 @@
           <a:p>
             <a:fld id="{128B42D0-5542-4246-B82D-1D330D744E73}" type="datetimeFigureOut">
               <a:rPr lang="en-IN" smtClean="0"/>
-              <a:t>15-10-2018</a:t>
+              <a:t>10-11-2018</a:t>
             </a:fld>
             <a:endParaRPr lang="en-IN"/>
           </a:p>
@@ -1415,7 +1415,7 @@
           <a:p>
             <a:fld id="{128B42D0-5542-4246-B82D-1D330D744E73}" type="datetimeFigureOut">
               <a:rPr lang="en-IN" smtClean="0"/>
-              <a:t>15-10-2018</a:t>
+              <a:t>10-11-2018</a:t>
             </a:fld>
             <a:endParaRPr lang="en-IN"/>
           </a:p>
@@ -1830,7 +1830,7 @@
           <a:p>
             <a:fld id="{128B42D0-5542-4246-B82D-1D330D744E73}" type="datetimeFigureOut">
               <a:rPr lang="en-IN" smtClean="0"/>
-              <a:t>15-10-2018</a:t>
+              <a:t>10-11-2018</a:t>
             </a:fld>
             <a:endParaRPr lang="en-IN"/>
           </a:p>
@@ -1972,7 +1972,7 @@
           <a:p>
             <a:fld id="{128B42D0-5542-4246-B82D-1D330D744E73}" type="datetimeFigureOut">
               <a:rPr lang="en-IN" smtClean="0"/>
-              <a:t>15-10-2018</a:t>
+              <a:t>10-11-2018</a:t>
             </a:fld>
             <a:endParaRPr lang="en-IN"/>
           </a:p>
@@ -2085,7 +2085,7 @@
           <a:p>
             <a:fld id="{128B42D0-5542-4246-B82D-1D330D744E73}" type="datetimeFigureOut">
               <a:rPr lang="en-IN" smtClean="0"/>
-              <a:t>15-10-2018</a:t>
+              <a:t>10-11-2018</a:t>
             </a:fld>
             <a:endParaRPr lang="en-IN"/>
           </a:p>
@@ -2398,7 +2398,7 @@
           <a:p>
             <a:fld id="{128B42D0-5542-4246-B82D-1D330D744E73}" type="datetimeFigureOut">
               <a:rPr lang="en-IN" smtClean="0"/>
-              <a:t>15-10-2018</a:t>
+              <a:t>10-11-2018</a:t>
             </a:fld>
             <a:endParaRPr lang="en-IN"/>
           </a:p>
@@ -2687,7 +2687,7 @@
           <a:p>
             <a:fld id="{128B42D0-5542-4246-B82D-1D330D744E73}" type="datetimeFigureOut">
               <a:rPr lang="en-IN" smtClean="0"/>
-              <a:t>15-10-2018</a:t>
+              <a:t>10-11-2018</a:t>
             </a:fld>
             <a:endParaRPr lang="en-IN"/>
           </a:p>
@@ -2930,7 +2930,7 @@
           <a:p>
             <a:fld id="{128B42D0-5542-4246-B82D-1D330D744E73}" type="datetimeFigureOut">
               <a:rPr lang="en-IN" smtClean="0"/>
-              <a:t>15-10-2018</a:t>
+              <a:t>10-11-2018</a:t>
             </a:fld>
             <a:endParaRPr lang="en-IN"/>
           </a:p>
@@ -3500,65 +3500,6 @@
       </p:sp>
       <p:sp>
         <p:nvSpPr>
-          <p:cNvPr id="10" name="Rectangle 8">
-            <a:extLst>
-              <a:ext uri="{FF2B5EF4-FFF2-40B4-BE49-F238E27FC236}">
-                <a16:creationId xmlns:a16="http://schemas.microsoft.com/office/drawing/2014/main" id="{389B8C2B-1FCC-774A-B328-3387F82EF7AF}"/>
-              </a:ext>
-            </a:extLst>
-          </p:cNvPr>
-          <p:cNvSpPr/>
-          <p:nvPr/>
-        </p:nvSpPr>
-        <p:spPr>
-          <a:xfrm>
-            <a:off x="4195042" y="1317538"/>
-            <a:ext cx="1589103" cy="346760"/>
-          </a:xfrm>
-          <a:prstGeom prst="rect">
-            <a:avLst/>
-          </a:prstGeom>
-          <a:ln/>
-        </p:spPr>
-        <p:style>
-          <a:lnRef idx="2">
-            <a:schemeClr val="accent4">
-              <a:shade val="50000"/>
-            </a:schemeClr>
-          </a:lnRef>
-          <a:fillRef idx="1">
-            <a:schemeClr val="accent4"/>
-          </a:fillRef>
-          <a:effectRef idx="0">
-            <a:schemeClr val="accent4"/>
-          </a:effectRef>
-          <a:fontRef idx="minor">
-            <a:schemeClr val="lt1"/>
-          </a:fontRef>
-        </p:style>
-        <p:txBody>
-          <a:bodyPr rtlCol="0" anchor="ctr"/>
-          <a:lstStyle/>
-          <a:p>
-            <a:pPr algn="ctr"/>
-            <a:r>
-              <a:rPr lang="en-US" sz="1400" b="1" i="1" dirty="0">
-                <a:solidFill>
-                  <a:schemeClr val="bg1"/>
-                </a:solidFill>
-              </a:rPr>
-              <a:t>Command</a:t>
-            </a:r>
-            <a:endParaRPr lang="en-SG" sz="1200" b="1" i="1" dirty="0">
-              <a:solidFill>
-                <a:schemeClr val="bg1"/>
-              </a:solidFill>
-            </a:endParaRPr>
-          </a:p>
-        </p:txBody>
-      </p:sp>
-      <p:sp>
-        <p:nvSpPr>
           <p:cNvPr id="11" name="Rectangle 8">
             <a:extLst>
               <a:ext uri="{FF2B5EF4-FFF2-40B4-BE49-F238E27FC236}">
@@ -3929,6 +3870,75 @@
               <a:t>1</a:t>
             </a:r>
             <a:endParaRPr lang="en-US" dirty="0"/>
+          </a:p>
+        </p:txBody>
+      </p:sp>
+      <p:sp>
+        <p:nvSpPr>
+          <p:cNvPr id="14" name="Rectangle 8">
+            <a:extLst>
+              <a:ext uri="{FF2B5EF4-FFF2-40B4-BE49-F238E27FC236}">
+                <a16:creationId xmlns:a16="http://schemas.microsoft.com/office/drawing/2014/main" id="{2D40644C-8E2D-4FC5-84E7-4ED19586D809}"/>
+              </a:ext>
+            </a:extLst>
+          </p:cNvPr>
+          <p:cNvSpPr/>
+          <p:nvPr/>
+        </p:nvSpPr>
+        <p:spPr>
+          <a:xfrm>
+            <a:off x="4191958" y="1081552"/>
+            <a:ext cx="1589103" cy="590268"/>
+          </a:xfrm>
+          <a:prstGeom prst="rect">
+            <a:avLst/>
+          </a:prstGeom>
+        </p:spPr>
+        <p:style>
+          <a:lnRef idx="2">
+            <a:schemeClr val="accent4">
+              <a:shade val="50000"/>
+            </a:schemeClr>
+          </a:lnRef>
+          <a:fillRef idx="1">
+            <a:schemeClr val="accent4"/>
+          </a:fillRef>
+          <a:effectRef idx="0">
+            <a:schemeClr val="accent4"/>
+          </a:effectRef>
+          <a:fontRef idx="minor">
+            <a:schemeClr val="lt1"/>
+          </a:fontRef>
+        </p:style>
+        <p:txBody>
+          <a:bodyPr rtlCol="0" anchor="ctr"/>
+          <a:lstStyle/>
+          <a:p>
+            <a:pPr algn="ctr"/>
+            <a:r>
+              <a:rPr lang="en-US" sz="1400" b="1" i="1" dirty="0">
+                <a:solidFill>
+                  <a:schemeClr val="bg1"/>
+                </a:solidFill>
+              </a:rPr>
+              <a:t>{abstract}</a:t>
+            </a:r>
+          </a:p>
+          <a:p>
+            <a:pPr algn="ctr"/>
+            <a:r>
+              <a:rPr lang="en-US" sz="1400" b="1" i="1" dirty="0">
+                <a:solidFill>
+                  <a:schemeClr val="bg1"/>
+                </a:solidFill>
+              </a:rPr>
+              <a:t>Command</a:t>
+            </a:r>
+            <a:endParaRPr lang="en-SG" sz="1200" b="1" i="1" dirty="0">
+              <a:solidFill>
+                <a:schemeClr val="bg1"/>
+              </a:solidFill>
+            </a:endParaRPr>
           </a:p>
         </p:txBody>
       </p:sp>

</xml_diff>